<commit_message>
Update Introduction to Contact Center.pptx
</commit_message>
<xml_diff>
--- a/Slides/Introduction to Contact Center.pptx
+++ b/Slides/Introduction to Contact Center.pptx
@@ -14,8 +14,8 @@
     <p:sldId id="256" r:id="rId5"/>
     <p:sldId id="286" r:id="rId6"/>
     <p:sldId id="295" r:id="rId7"/>
-    <p:sldId id="292" r:id="rId8"/>
-    <p:sldId id="293" r:id="rId9"/>
+    <p:sldId id="293" r:id="rId8"/>
+    <p:sldId id="292" r:id="rId9"/>
     <p:sldId id="296" r:id="rId10"/>
     <p:sldId id="301" r:id="rId11"/>
     <p:sldId id="299" r:id="rId12"/>
@@ -236,7 +236,7 @@
           <a:p>
             <a:fld id="{B56F32FC-4BD9-442A-A8C6-51598C909FE3}" type="datetimeFigureOut">
               <a:rPr lang="en-US" smtClean="0"/>
-              <a:t>8/8/2025</a:t>
+              <a:t>11/8/2025</a:t>
             </a:fld>
             <a:endParaRPr lang="en-US" dirty="0"/>
           </a:p>
@@ -413,7 +413,7 @@
           <a:p>
             <a:fld id="{056371FA-A98D-41E8-93F4-09945841298A}" type="datetimeFigureOut">
               <a:rPr lang="en-US" smtClean="0"/>
-              <a:t>8/8/2025</a:t>
+              <a:t>11/8/2025</a:t>
             </a:fld>
             <a:endParaRPr lang="en-US" dirty="0"/>
           </a:p>
@@ -937,7 +937,7 @@
           <a:p>
             <a:fld id="{22289C57-55D7-40A4-A101-E74FAC7A092B}" type="slidenum">
               <a:rPr lang="en-US" smtClean="0"/>
-              <a:t>5</a:t>
+              <a:t>4</a:t>
             </a:fld>
             <a:endParaRPr lang="en-US" dirty="0"/>
           </a:p>
@@ -6842,7 +6842,7 @@
         </p:spPr>
         <p:txBody>
           <a:bodyPr>
-            <a:normAutofit fontScale="92500" lnSpcReduction="20000"/>
+            <a:normAutofit/>
           </a:bodyPr>
           <a:lstStyle/>
           <a:p>
@@ -6862,7 +6862,7 @@
             </a:pPr>
             <a:r>
               <a:rPr lang="en-US" dirty="0"/>
-              <a:t>Industries &amp; Companies Using Contact Center</a:t>
+              <a:t>Key Functions of Contact Center</a:t>
             </a:r>
           </a:p>
           <a:p>
@@ -6872,7 +6872,7 @@
             </a:pPr>
             <a:r>
               <a:rPr lang="en-US" dirty="0"/>
-              <a:t>Key Functions of Contact Center</a:t>
+              <a:t>Industries &amp; Companies Using Contact Center</a:t>
             </a:r>
           </a:p>
           <a:p>
@@ -6892,30 +6892,7 @@
               <a:rPr lang="en-US" dirty="0"/>
               <a:t>Contact Center</a:t>
             </a:r>
-            <a:r>
-              <a:rPr lang="en-US" i="1" dirty="0"/>
-              <a:t> </a:t>
-            </a:r>
-          </a:p>
-          <a:p>
-            <a:pPr marL="285750" indent="-285750">
-              <a:buFont typeface="Arial" panose="020B0604020202020204" pitchFamily="34" charset="0"/>
-              <a:buChar char="•"/>
-            </a:pPr>
-            <a:r>
-              <a:rPr lang="en-US" dirty="0"/>
-              <a:t>Quiz – True or False</a:t>
-            </a:r>
-          </a:p>
-          <a:p>
-            <a:pPr marL="285750" indent="-285750">
-              <a:buFont typeface="Arial" panose="020B0604020202020204" pitchFamily="34" charset="0"/>
-              <a:buChar char="•"/>
-            </a:pPr>
-            <a:r>
-              <a:rPr lang="en-US" dirty="0"/>
-              <a:t>Quiz – Matching</a:t>
-            </a:r>
+            <a:endParaRPr lang="en-US" i="1" dirty="0"/>
           </a:p>
         </p:txBody>
       </p:sp>
@@ -7236,21 +7213,30 @@
                             </p:childTnLst>
                           </p:cTn>
                         </p:par>
+                      </p:childTnLst>
+                    </p:cTn>
+                  </p:par>
+                  <p:par>
+                    <p:cTn id="20" fill="hold">
+                      <p:stCondLst>
+                        <p:cond delay="indefinite"/>
+                      </p:stCondLst>
+                      <p:childTnLst>
                         <p:par>
-                          <p:cTn id="20" fill="hold">
+                          <p:cTn id="21" fill="hold">
                             <p:stCondLst>
-                              <p:cond delay="1000"/>
+                              <p:cond delay="0"/>
                             </p:stCondLst>
                             <p:childTnLst>
                               <p:par>
-                                <p:cTn id="21" presetID="12" presetClass="entr" presetSubtype="4" fill="hold" grpId="0" nodeType="afterEffect">
+                                <p:cTn id="22" presetID="12" presetClass="entr" presetSubtype="4" fill="hold" grpId="0" nodeType="clickEffect">
                                   <p:stCondLst>
                                     <p:cond delay="0"/>
                                   </p:stCondLst>
                                   <p:childTnLst>
                                     <p:set>
                                       <p:cBhvr>
-                                        <p:cTn id="22" dur="1" fill="hold">
+                                        <p:cTn id="23" dur="1" fill="hold">
                                           <p:stCondLst>
                                             <p:cond delay="0"/>
                                           </p:stCondLst>
@@ -7272,7 +7258,7 @@
                                     </p:set>
                                     <p:anim calcmode="lin" valueType="num">
                                       <p:cBhvr additive="base">
-                                        <p:cTn id="23" dur="250"/>
+                                        <p:cTn id="24" dur="250"/>
                                         <p:tgtEl>
                                           <p:spTgt spid="3">
                                             <p:txEl>
@@ -7299,7 +7285,7 @@
                                     </p:anim>
                                     <p:animEffect transition="in" filter="wipe(up)">
                                       <p:cBhvr>
-                                        <p:cTn id="24" dur="250"/>
+                                        <p:cTn id="25" dur="250"/>
                                         <p:tgtEl>
                                           <p:spTgt spid="3">
                                             <p:txEl>
@@ -7316,20 +7302,20 @@
                           </p:cTn>
                         </p:par>
                         <p:par>
-                          <p:cTn id="25" fill="hold">
+                          <p:cTn id="26" fill="hold">
                             <p:stCondLst>
-                              <p:cond delay="1250"/>
+                              <p:cond delay="250"/>
                             </p:stCondLst>
                             <p:childTnLst>
                               <p:par>
-                                <p:cTn id="26" presetID="12" presetClass="entr" presetSubtype="4" fill="hold" grpId="0" nodeType="afterEffect">
+                                <p:cTn id="27" presetID="12" presetClass="entr" presetSubtype="4" fill="hold" grpId="0" nodeType="afterEffect">
                                   <p:stCondLst>
                                     <p:cond delay="0"/>
                                   </p:stCondLst>
                                   <p:childTnLst>
                                     <p:set>
                                       <p:cBhvr>
-                                        <p:cTn id="27" dur="1" fill="hold">
+                                        <p:cTn id="28" dur="1" fill="hold">
                                           <p:stCondLst>
                                             <p:cond delay="0"/>
                                           </p:stCondLst>
@@ -7351,7 +7337,7 @@
                                     </p:set>
                                     <p:anim calcmode="lin" valueType="num">
                                       <p:cBhvr additive="base">
-                                        <p:cTn id="28" dur="250"/>
+                                        <p:cTn id="29" dur="250"/>
                                         <p:tgtEl>
                                           <p:spTgt spid="3">
                                             <p:txEl>
@@ -7378,169 +7364,11 @@
                                     </p:anim>
                                     <p:animEffect transition="in" filter="wipe(up)">
                                       <p:cBhvr>
-                                        <p:cTn id="29" dur="250"/>
+                                        <p:cTn id="30" dur="250"/>
                                         <p:tgtEl>
                                           <p:spTgt spid="3">
                                             <p:txEl>
                                               <p:pRg st="3" end="3"/>
-                                            </p:txEl>
-                                          </p:spTgt>
-                                        </p:tgtEl>
-                                      </p:cBhvr>
-                                    </p:animEffect>
-                                  </p:childTnLst>
-                                </p:cTn>
-                              </p:par>
-                            </p:childTnLst>
-                          </p:cTn>
-                        </p:par>
-                        <p:par>
-                          <p:cTn id="30" fill="hold">
-                            <p:stCondLst>
-                              <p:cond delay="1500"/>
-                            </p:stCondLst>
-                            <p:childTnLst>
-                              <p:par>
-                                <p:cTn id="31" presetID="12" presetClass="entr" presetSubtype="4" fill="hold" grpId="0" nodeType="afterEffect">
-                                  <p:stCondLst>
-                                    <p:cond delay="0"/>
-                                  </p:stCondLst>
-                                  <p:childTnLst>
-                                    <p:set>
-                                      <p:cBhvr>
-                                        <p:cTn id="32" dur="1" fill="hold">
-                                          <p:stCondLst>
-                                            <p:cond delay="0"/>
-                                          </p:stCondLst>
-                                        </p:cTn>
-                                        <p:tgtEl>
-                                          <p:spTgt spid="3">
-                                            <p:txEl>
-                                              <p:pRg st="4" end="4"/>
-                                            </p:txEl>
-                                          </p:spTgt>
-                                        </p:tgtEl>
-                                        <p:attrNameLst>
-                                          <p:attrName>style.visibility</p:attrName>
-                                        </p:attrNameLst>
-                                      </p:cBhvr>
-                                      <p:to>
-                                        <p:strVal val="visible"/>
-                                      </p:to>
-                                    </p:set>
-                                    <p:anim calcmode="lin" valueType="num">
-                                      <p:cBhvr additive="base">
-                                        <p:cTn id="33" dur="250"/>
-                                        <p:tgtEl>
-                                          <p:spTgt spid="3">
-                                            <p:txEl>
-                                              <p:pRg st="4" end="4"/>
-                                            </p:txEl>
-                                          </p:spTgt>
-                                        </p:tgtEl>
-                                        <p:attrNameLst>
-                                          <p:attrName>ppt_y</p:attrName>
-                                        </p:attrNameLst>
-                                      </p:cBhvr>
-                                      <p:tavLst>
-                                        <p:tav tm="0">
-                                          <p:val>
-                                            <p:strVal val="#ppt_y+#ppt_h*1.125000"/>
-                                          </p:val>
-                                        </p:tav>
-                                        <p:tav tm="100000">
-                                          <p:val>
-                                            <p:strVal val="#ppt_y"/>
-                                          </p:val>
-                                        </p:tav>
-                                      </p:tavLst>
-                                    </p:anim>
-                                    <p:animEffect transition="in" filter="wipe(up)">
-                                      <p:cBhvr>
-                                        <p:cTn id="34" dur="250"/>
-                                        <p:tgtEl>
-                                          <p:spTgt spid="3">
-                                            <p:txEl>
-                                              <p:pRg st="4" end="4"/>
-                                            </p:txEl>
-                                          </p:spTgt>
-                                        </p:tgtEl>
-                                      </p:cBhvr>
-                                    </p:animEffect>
-                                  </p:childTnLst>
-                                </p:cTn>
-                              </p:par>
-                            </p:childTnLst>
-                          </p:cTn>
-                        </p:par>
-                        <p:par>
-                          <p:cTn id="35" fill="hold">
-                            <p:stCondLst>
-                              <p:cond delay="1750"/>
-                            </p:stCondLst>
-                            <p:childTnLst>
-                              <p:par>
-                                <p:cTn id="36" presetID="12" presetClass="entr" presetSubtype="4" fill="hold" grpId="0" nodeType="afterEffect">
-                                  <p:stCondLst>
-                                    <p:cond delay="0"/>
-                                  </p:stCondLst>
-                                  <p:childTnLst>
-                                    <p:set>
-                                      <p:cBhvr>
-                                        <p:cTn id="37" dur="1" fill="hold">
-                                          <p:stCondLst>
-                                            <p:cond delay="0"/>
-                                          </p:stCondLst>
-                                        </p:cTn>
-                                        <p:tgtEl>
-                                          <p:spTgt spid="3">
-                                            <p:txEl>
-                                              <p:pRg st="5" end="5"/>
-                                            </p:txEl>
-                                          </p:spTgt>
-                                        </p:tgtEl>
-                                        <p:attrNameLst>
-                                          <p:attrName>style.visibility</p:attrName>
-                                        </p:attrNameLst>
-                                      </p:cBhvr>
-                                      <p:to>
-                                        <p:strVal val="visible"/>
-                                      </p:to>
-                                    </p:set>
-                                    <p:anim calcmode="lin" valueType="num">
-                                      <p:cBhvr additive="base">
-                                        <p:cTn id="38" dur="250"/>
-                                        <p:tgtEl>
-                                          <p:spTgt spid="3">
-                                            <p:txEl>
-                                              <p:pRg st="5" end="5"/>
-                                            </p:txEl>
-                                          </p:spTgt>
-                                        </p:tgtEl>
-                                        <p:attrNameLst>
-                                          <p:attrName>ppt_y</p:attrName>
-                                        </p:attrNameLst>
-                                      </p:cBhvr>
-                                      <p:tavLst>
-                                        <p:tav tm="0">
-                                          <p:val>
-                                            <p:strVal val="#ppt_y+#ppt_h*1.125000"/>
-                                          </p:val>
-                                        </p:tav>
-                                        <p:tav tm="100000">
-                                          <p:val>
-                                            <p:strVal val="#ppt_y"/>
-                                          </p:val>
-                                        </p:tav>
-                                      </p:tavLst>
-                                    </p:anim>
-                                    <p:animEffect transition="in" filter="wipe(up)">
-                                      <p:cBhvr>
-                                        <p:cTn id="39" dur="250"/>
-                                        <p:tgtEl>
-                                          <p:spTgt spid="3">
-                                            <p:txEl>
-                                              <p:pRg st="5" end="5"/>
                                             </p:txEl>
                                           </p:spTgt>
                                         </p:tgtEl>
@@ -8432,6 +8260,858 @@
   <p:cSld>
     <p:spTree>
       <p:nvGrpSpPr>
+        <p:cNvPr id="1" name="">
+          <a:extLst>
+            <a:ext uri="{FF2B5EF4-FFF2-40B4-BE49-F238E27FC236}">
+              <a16:creationId xmlns:a16="http://schemas.microsoft.com/office/drawing/2014/main" id="{78478993-7F33-5FE6-4CFB-FEAA8128370E}"/>
+            </a:ext>
+          </a:extLst>
+        </p:cNvPr>
+        <p:cNvGrpSpPr/>
+        <p:nvPr/>
+      </p:nvGrpSpPr>
+      <p:grpSpPr>
+        <a:xfrm>
+          <a:off x="0" y="0"/>
+          <a:ext cx="0" cy="0"/>
+          <a:chOff x="0" y="0"/>
+          <a:chExt cx="0" cy="0"/>
+        </a:xfrm>
+      </p:grpSpPr>
+      <p:sp>
+        <p:nvSpPr>
+          <p:cNvPr id="8" name="Title 2">
+            <a:extLst>
+              <a:ext uri="{FF2B5EF4-FFF2-40B4-BE49-F238E27FC236}">
+                <a16:creationId xmlns:a16="http://schemas.microsoft.com/office/drawing/2014/main" id="{3A06695E-6E03-C518-2B14-01E2B6AD6509}"/>
+              </a:ext>
+            </a:extLst>
+          </p:cNvPr>
+          <p:cNvSpPr>
+            <a:spLocks noGrp="1"/>
+          </p:cNvSpPr>
+          <p:nvPr>
+            <p:ph type="title"/>
+          </p:nvPr>
+        </p:nvSpPr>
+        <p:spPr>
+          <a:xfrm>
+            <a:off x="838200" y="353550"/>
+            <a:ext cx="10515600" cy="1325563"/>
+          </a:xfrm>
+        </p:spPr>
+        <p:txBody>
+          <a:bodyPr anchor="b"/>
+          <a:lstStyle/>
+          <a:p>
+            <a:r>
+              <a:rPr lang="en-US" b="1" dirty="0"/>
+              <a:t>Key Functions</a:t>
+            </a:r>
+            <a:br>
+              <a:rPr lang="en-US" dirty="0"/>
+            </a:br>
+            <a:r>
+              <a:rPr lang="en-US" sz="2400" dirty="0"/>
+              <a:t>of Contact Center</a:t>
+            </a:r>
+            <a:endParaRPr lang="en-US" dirty="0"/>
+          </a:p>
+        </p:txBody>
+      </p:sp>
+      <p:graphicFrame>
+        <p:nvGraphicFramePr>
+          <p:cNvPr id="13" name="Table Placeholder 2">
+            <a:extLst>
+              <a:ext uri="{FF2B5EF4-FFF2-40B4-BE49-F238E27FC236}">
+                <a16:creationId xmlns:a16="http://schemas.microsoft.com/office/drawing/2014/main" id="{26A85F69-7190-083C-44A3-20343C811980}"/>
+              </a:ext>
+            </a:extLst>
+          </p:cNvPr>
+          <p:cNvGraphicFramePr>
+            <a:graphicFrameLocks noGrp="1"/>
+          </p:cNvGraphicFramePr>
+          <p:nvPr>
+            <p:ph type="tbl" sz="quarter" idx="14"/>
+            <p:extLst>
+              <p:ext uri="{D42A27DB-BD31-4B8C-83A1-F6EECF244321}">
+                <p14:modId xmlns:p14="http://schemas.microsoft.com/office/powerpoint/2010/main" val="209561069"/>
+              </p:ext>
+            </p:extLst>
+          </p:nvPr>
+        </p:nvGraphicFramePr>
+        <p:xfrm>
+          <a:off x="838200" y="2111375"/>
+          <a:ext cx="10476000" cy="3960000"/>
+        </p:xfrm>
+        <a:graphic>
+          <a:graphicData uri="http://schemas.openxmlformats.org/drawingml/2006/table">
+            <a:tbl>
+              <a:tblPr firstRow="1" bandRow="1">
+                <a:tableStyleId>{7E9639D4-E3E2-4D34-9284-5A2195B3D0D7}</a:tableStyleId>
+              </a:tblPr>
+              <a:tblGrid>
+                <a:gridCol w="2124000">
+                  <a:extLst>
+                    <a:ext uri="{9D8B030D-6E8A-4147-A177-3AD203B41FA5}">
+                      <a16:colId xmlns:a16="http://schemas.microsoft.com/office/drawing/2014/main" val="127040821"/>
+                    </a:ext>
+                  </a:extLst>
+                </a:gridCol>
+                <a:gridCol w="4176000">
+                  <a:extLst>
+                    <a:ext uri="{9D8B030D-6E8A-4147-A177-3AD203B41FA5}">
+                      <a16:colId xmlns:a16="http://schemas.microsoft.com/office/drawing/2014/main" val="149845700"/>
+                    </a:ext>
+                  </a:extLst>
+                </a:gridCol>
+                <a:gridCol w="4176000">
+                  <a:extLst>
+                    <a:ext uri="{9D8B030D-6E8A-4147-A177-3AD203B41FA5}">
+                      <a16:colId xmlns:a16="http://schemas.microsoft.com/office/drawing/2014/main" val="3119692462"/>
+                    </a:ext>
+                  </a:extLst>
+                </a:gridCol>
+              </a:tblGrid>
+              <a:tr h="720000">
+                <a:tc>
+                  <a:txBody>
+                    <a:bodyPr/>
+                    <a:lstStyle/>
+                    <a:p>
+                      <a:pPr algn="l"/>
+                      <a:r>
+                        <a:rPr lang="en-US" sz="1800" b="1" kern="1200" dirty="0">
+                          <a:solidFill>
+                            <a:schemeClr val="bg1"/>
+                          </a:solidFill>
+                          <a:effectLst/>
+                          <a:latin typeface="+mn-lt"/>
+                          <a:ea typeface="+mn-ea"/>
+                          <a:cs typeface="+mn-cs"/>
+                        </a:rPr>
+                        <a:t>FUNCTION</a:t>
+                      </a:r>
+                    </a:p>
+                  </a:txBody>
+                  <a:tcPr anchor="ctr"/>
+                </a:tc>
+                <a:tc>
+                  <a:txBody>
+                    <a:bodyPr/>
+                    <a:lstStyle/>
+                    <a:p>
+                      <a:pPr marL="0" marR="0" lvl="0" indent="0" algn="l" defTabSz="914400" rtl="0" eaLnBrk="1" fontAlgn="auto" latinLnBrk="0" hangingPunct="1">
+                        <a:lnSpc>
+                          <a:spcPct val="100000"/>
+                        </a:lnSpc>
+                        <a:spcBef>
+                          <a:spcPts val="0"/>
+                        </a:spcBef>
+                        <a:spcAft>
+                          <a:spcPts val="0"/>
+                        </a:spcAft>
+                        <a:buClrTx/>
+                        <a:buSzTx/>
+                        <a:buFontTx/>
+                        <a:buNone/>
+                        <a:tabLst/>
+                        <a:defRPr/>
+                      </a:pPr>
+                      <a:r>
+                        <a:rPr lang="en-US" sz="1800" b="1" kern="1200" dirty="0">
+                          <a:solidFill>
+                            <a:schemeClr val="bg1"/>
+                          </a:solidFill>
+                          <a:effectLst/>
+                          <a:latin typeface="+mn-lt"/>
+                          <a:ea typeface="+mn-ea"/>
+                          <a:cs typeface="+mn-cs"/>
+                        </a:rPr>
+                        <a:t>WHAT IT MEANS</a:t>
+                      </a:r>
+                    </a:p>
+                  </a:txBody>
+                  <a:tcPr anchor="ctr"/>
+                </a:tc>
+                <a:tc>
+                  <a:txBody>
+                    <a:bodyPr/>
+                    <a:lstStyle/>
+                    <a:p>
+                      <a:pPr algn="l"/>
+                      <a:r>
+                        <a:rPr lang="en-US" b="1" dirty="0"/>
+                        <a:t>REAL-LIFE EXAMPLE</a:t>
+                      </a:r>
+                    </a:p>
+                  </a:txBody>
+                  <a:tcPr anchor="ctr"/>
+                </a:tc>
+                <a:extLst>
+                  <a:ext uri="{0D108BD9-81ED-4DB2-BD59-A6C34878D82A}">
+                    <a16:rowId xmlns:a16="http://schemas.microsoft.com/office/drawing/2014/main" val="3298013591"/>
+                  </a:ext>
+                </a:extLst>
+              </a:tr>
+              <a:tr h="648000">
+                <a:tc>
+                  <a:txBody>
+                    <a:bodyPr/>
+                    <a:lstStyle/>
+                    <a:p>
+                      <a:pPr algn="l"/>
+                      <a:r>
+                        <a:rPr lang="en-US" sz="1800" b="1" kern="1200" dirty="0">
+                          <a:solidFill>
+                            <a:schemeClr val="tx1"/>
+                          </a:solidFill>
+                          <a:effectLst/>
+                          <a:latin typeface="+mn-lt"/>
+                          <a:ea typeface="+mn-ea"/>
+                          <a:cs typeface="+mn-cs"/>
+                        </a:rPr>
+                        <a:t>Provide Services</a:t>
+                      </a:r>
+                    </a:p>
+                  </a:txBody>
+                  <a:tcPr anchor="ctr"/>
+                </a:tc>
+                <a:tc>
+                  <a:txBody>
+                    <a:bodyPr/>
+                    <a:lstStyle/>
+                    <a:p>
+                      <a:pPr marL="0" marR="0" lvl="0" indent="0" algn="l" defTabSz="914400" rtl="0" eaLnBrk="1" fontAlgn="auto" latinLnBrk="0" hangingPunct="1">
+                        <a:lnSpc>
+                          <a:spcPct val="100000"/>
+                        </a:lnSpc>
+                        <a:spcBef>
+                          <a:spcPts val="0"/>
+                        </a:spcBef>
+                        <a:spcAft>
+                          <a:spcPts val="0"/>
+                        </a:spcAft>
+                        <a:buClrTx/>
+                        <a:buSzTx/>
+                        <a:buFontTx/>
+                        <a:buNone/>
+                        <a:tabLst/>
+                        <a:defRPr/>
+                      </a:pPr>
+                      <a:r>
+                        <a:rPr lang="en-US" sz="1800" b="0" kern="1200" dirty="0">
+                          <a:solidFill>
+                            <a:schemeClr val="tx1"/>
+                          </a:solidFill>
+                          <a:effectLst/>
+                          <a:latin typeface="+mn-lt"/>
+                          <a:ea typeface="+mn-ea"/>
+                          <a:cs typeface="+mn-cs"/>
+                        </a:rPr>
+                        <a:t>Help customers use or manage services</a:t>
+                      </a:r>
+                    </a:p>
+                  </a:txBody>
+                  <a:tcPr anchor="ctr"/>
+                </a:tc>
+                <a:tc>
+                  <a:txBody>
+                    <a:bodyPr/>
+                    <a:lstStyle/>
+                    <a:p>
+                      <a:pPr marL="0" marR="0" lvl="0" indent="0" algn="l" defTabSz="914400" rtl="0" eaLnBrk="1" fontAlgn="auto" latinLnBrk="0" hangingPunct="1">
+                        <a:lnSpc>
+                          <a:spcPct val="100000"/>
+                        </a:lnSpc>
+                        <a:spcBef>
+                          <a:spcPts val="0"/>
+                        </a:spcBef>
+                        <a:spcAft>
+                          <a:spcPts val="0"/>
+                        </a:spcAft>
+                        <a:buClrTx/>
+                        <a:buSzTx/>
+                        <a:buFontTx/>
+                        <a:buNone/>
+                        <a:tabLst/>
+                        <a:defRPr/>
+                      </a:pPr>
+                      <a:r>
+                        <a:rPr lang="en-US" sz="1800" b="0" kern="1200" dirty="0">
+                          <a:solidFill>
+                            <a:schemeClr val="tx1"/>
+                          </a:solidFill>
+                          <a:effectLst/>
+                          <a:latin typeface="+mn-lt"/>
+                          <a:ea typeface="+mn-ea"/>
+                          <a:cs typeface="+mn-cs"/>
+                        </a:rPr>
+                        <a:t>Recharging your mobile balance by calling customer service</a:t>
+                      </a:r>
+                    </a:p>
+                  </a:txBody>
+                  <a:tcPr anchor="ctr"/>
+                </a:tc>
+                <a:extLst>
+                  <a:ext uri="{0D108BD9-81ED-4DB2-BD59-A6C34878D82A}">
+                    <a16:rowId xmlns:a16="http://schemas.microsoft.com/office/drawing/2014/main" val="3873867931"/>
+                  </a:ext>
+                </a:extLst>
+              </a:tr>
+              <a:tr h="648000">
+                <a:tc>
+                  <a:txBody>
+                    <a:bodyPr/>
+                    <a:lstStyle/>
+                    <a:p>
+                      <a:pPr marL="0" marR="0" lvl="0" indent="0" algn="l" defTabSz="914400" rtl="0" eaLnBrk="1" fontAlgn="auto" latinLnBrk="0" hangingPunct="1">
+                        <a:lnSpc>
+                          <a:spcPct val="100000"/>
+                        </a:lnSpc>
+                        <a:spcBef>
+                          <a:spcPts val="0"/>
+                        </a:spcBef>
+                        <a:spcAft>
+                          <a:spcPts val="0"/>
+                        </a:spcAft>
+                        <a:buClrTx/>
+                        <a:buSzTx/>
+                        <a:buFontTx/>
+                        <a:buNone/>
+                        <a:tabLst/>
+                        <a:defRPr/>
+                      </a:pPr>
+                      <a:r>
+                        <a:rPr lang="en-US" sz="1800" b="1" kern="1200" dirty="0">
+                          <a:solidFill>
+                            <a:schemeClr val="tx1"/>
+                          </a:solidFill>
+                          <a:effectLst/>
+                          <a:latin typeface="+mn-lt"/>
+                          <a:ea typeface="+mn-ea"/>
+                          <a:cs typeface="+mn-cs"/>
+                        </a:rPr>
+                        <a:t>Technical Support</a:t>
+                      </a:r>
+                    </a:p>
+                  </a:txBody>
+                  <a:tcPr anchor="ctr"/>
+                </a:tc>
+                <a:tc>
+                  <a:txBody>
+                    <a:bodyPr/>
+                    <a:lstStyle/>
+                    <a:p>
+                      <a:pPr marL="0" marR="0" lvl="0" indent="0" algn="l" defTabSz="914400" rtl="0" eaLnBrk="1" fontAlgn="auto" latinLnBrk="0" hangingPunct="1">
+                        <a:lnSpc>
+                          <a:spcPct val="100000"/>
+                        </a:lnSpc>
+                        <a:spcBef>
+                          <a:spcPts val="0"/>
+                        </a:spcBef>
+                        <a:spcAft>
+                          <a:spcPts val="0"/>
+                        </a:spcAft>
+                        <a:buClrTx/>
+                        <a:buSzTx/>
+                        <a:buFontTx/>
+                        <a:buNone/>
+                        <a:tabLst/>
+                        <a:defRPr/>
+                      </a:pPr>
+                      <a:r>
+                        <a:rPr lang="en-US" sz="1800" b="0" kern="1200" dirty="0">
+                          <a:solidFill>
+                            <a:schemeClr val="tx1"/>
+                          </a:solidFill>
+                          <a:effectLst/>
+                          <a:latin typeface="+mn-lt"/>
+                          <a:ea typeface="+mn-ea"/>
+                          <a:cs typeface="+mn-cs"/>
+                        </a:rPr>
+                        <a:t>Fix a problem with a product or service</a:t>
+                      </a:r>
+                    </a:p>
+                  </a:txBody>
+                  <a:tcPr anchor="ctr"/>
+                </a:tc>
+                <a:tc>
+                  <a:txBody>
+                    <a:bodyPr/>
+                    <a:lstStyle/>
+                    <a:p>
+                      <a:pPr marL="0" marR="0" lvl="0" indent="0" algn="l" defTabSz="914400" rtl="0" eaLnBrk="1" fontAlgn="auto" latinLnBrk="0" hangingPunct="1">
+                        <a:lnSpc>
+                          <a:spcPct val="100000"/>
+                        </a:lnSpc>
+                        <a:spcBef>
+                          <a:spcPts val="0"/>
+                        </a:spcBef>
+                        <a:spcAft>
+                          <a:spcPts val="0"/>
+                        </a:spcAft>
+                        <a:buClrTx/>
+                        <a:buSzTx/>
+                        <a:buFontTx/>
+                        <a:buNone/>
+                        <a:tabLst/>
+                        <a:defRPr/>
+                      </a:pPr>
+                      <a:r>
+                        <a:rPr lang="en-US" sz="1800" b="0" kern="1200" dirty="0">
+                          <a:solidFill>
+                            <a:schemeClr val="tx1"/>
+                          </a:solidFill>
+                          <a:effectLst/>
+                          <a:latin typeface="+mn-lt"/>
+                          <a:ea typeface="+mn-ea"/>
+                          <a:cs typeface="+mn-cs"/>
+                        </a:rPr>
+                        <a:t>Getting help to fix your home internet connection</a:t>
+                      </a:r>
+                    </a:p>
+                  </a:txBody>
+                  <a:tcPr anchor="ctr"/>
+                </a:tc>
+                <a:extLst>
+                  <a:ext uri="{0D108BD9-81ED-4DB2-BD59-A6C34878D82A}">
+                    <a16:rowId xmlns:a16="http://schemas.microsoft.com/office/drawing/2014/main" val="85209771"/>
+                  </a:ext>
+                </a:extLst>
+              </a:tr>
+              <a:tr h="648000">
+                <a:tc>
+                  <a:txBody>
+                    <a:bodyPr/>
+                    <a:lstStyle/>
+                    <a:p>
+                      <a:pPr marL="0" marR="0" lvl="0" indent="0" algn="l" defTabSz="914400" rtl="0" eaLnBrk="1" fontAlgn="auto" latinLnBrk="0" hangingPunct="1">
+                        <a:lnSpc>
+                          <a:spcPct val="100000"/>
+                        </a:lnSpc>
+                        <a:spcBef>
+                          <a:spcPts val="0"/>
+                        </a:spcBef>
+                        <a:spcAft>
+                          <a:spcPts val="0"/>
+                        </a:spcAft>
+                        <a:buClrTx/>
+                        <a:buSzTx/>
+                        <a:buFontTx/>
+                        <a:buNone/>
+                        <a:tabLst/>
+                        <a:defRPr/>
+                      </a:pPr>
+                      <a:r>
+                        <a:rPr lang="en-US" sz="1800" b="1" kern="1200" dirty="0">
+                          <a:solidFill>
+                            <a:schemeClr val="tx1"/>
+                          </a:solidFill>
+                          <a:effectLst/>
+                          <a:latin typeface="+mn-lt"/>
+                          <a:ea typeface="+mn-ea"/>
+                          <a:cs typeface="+mn-cs"/>
+                        </a:rPr>
+                        <a:t>Handle Complaints</a:t>
+                      </a:r>
+                    </a:p>
+                  </a:txBody>
+                  <a:tcPr anchor="ctr"/>
+                </a:tc>
+                <a:tc>
+                  <a:txBody>
+                    <a:bodyPr/>
+                    <a:lstStyle/>
+                    <a:p>
+                      <a:pPr marL="0" marR="0" lvl="0" indent="0" algn="l" defTabSz="914400" rtl="0" eaLnBrk="1" fontAlgn="auto" latinLnBrk="0" hangingPunct="1">
+                        <a:lnSpc>
+                          <a:spcPct val="100000"/>
+                        </a:lnSpc>
+                        <a:spcBef>
+                          <a:spcPts val="0"/>
+                        </a:spcBef>
+                        <a:spcAft>
+                          <a:spcPts val="0"/>
+                        </a:spcAft>
+                        <a:buClrTx/>
+                        <a:buSzTx/>
+                        <a:buFontTx/>
+                        <a:buNone/>
+                        <a:tabLst/>
+                        <a:defRPr/>
+                      </a:pPr>
+                      <a:r>
+                        <a:rPr lang="en-US" sz="1800" b="0" kern="1200" dirty="0">
+                          <a:solidFill>
+                            <a:schemeClr val="tx1"/>
+                          </a:solidFill>
+                          <a:effectLst/>
+                          <a:latin typeface="+mn-lt"/>
+                          <a:ea typeface="+mn-ea"/>
+                          <a:cs typeface="+mn-cs"/>
+                        </a:rPr>
+                        <a:t>Listen to problems and find solutions</a:t>
+                      </a:r>
+                    </a:p>
+                  </a:txBody>
+                  <a:tcPr anchor="ctr"/>
+                </a:tc>
+                <a:tc>
+                  <a:txBody>
+                    <a:bodyPr/>
+                    <a:lstStyle/>
+                    <a:p>
+                      <a:pPr marL="0" marR="0" lvl="0" indent="0" algn="l" defTabSz="914400" rtl="0" eaLnBrk="1" fontAlgn="auto" latinLnBrk="0" hangingPunct="1">
+                        <a:lnSpc>
+                          <a:spcPct val="100000"/>
+                        </a:lnSpc>
+                        <a:spcBef>
+                          <a:spcPts val="0"/>
+                        </a:spcBef>
+                        <a:spcAft>
+                          <a:spcPts val="0"/>
+                        </a:spcAft>
+                        <a:buClrTx/>
+                        <a:buSzTx/>
+                        <a:buFontTx/>
+                        <a:buNone/>
+                        <a:tabLst/>
+                        <a:defRPr/>
+                      </a:pPr>
+                      <a:r>
+                        <a:rPr lang="en-US" sz="1800" b="0" kern="1200" dirty="0">
+                          <a:solidFill>
+                            <a:schemeClr val="tx1"/>
+                          </a:solidFill>
+                          <a:effectLst/>
+                          <a:latin typeface="+mn-lt"/>
+                          <a:ea typeface="+mn-ea"/>
+                          <a:cs typeface="+mn-cs"/>
+                        </a:rPr>
+                        <a:t>A customer complains about a wrong bill and the agent fixes it</a:t>
+                      </a:r>
+                    </a:p>
+                  </a:txBody>
+                  <a:tcPr anchor="ctr"/>
+                </a:tc>
+                <a:extLst>
+                  <a:ext uri="{0D108BD9-81ED-4DB2-BD59-A6C34878D82A}">
+                    <a16:rowId xmlns:a16="http://schemas.microsoft.com/office/drawing/2014/main" val="4061031278"/>
+                  </a:ext>
+                </a:extLst>
+              </a:tr>
+              <a:tr h="648000">
+                <a:tc>
+                  <a:txBody>
+                    <a:bodyPr/>
+                    <a:lstStyle/>
+                    <a:p>
+                      <a:pPr marL="0" marR="0" lvl="0" indent="0" algn="l" defTabSz="914400" rtl="0" eaLnBrk="1" fontAlgn="auto" latinLnBrk="0" hangingPunct="1">
+                        <a:lnSpc>
+                          <a:spcPct val="100000"/>
+                        </a:lnSpc>
+                        <a:spcBef>
+                          <a:spcPts val="0"/>
+                        </a:spcBef>
+                        <a:spcAft>
+                          <a:spcPts val="0"/>
+                        </a:spcAft>
+                        <a:buClrTx/>
+                        <a:buSzTx/>
+                        <a:buFontTx/>
+                        <a:buNone/>
+                        <a:tabLst/>
+                        <a:defRPr/>
+                      </a:pPr>
+                      <a:r>
+                        <a:rPr lang="en-US" sz="1800" b="1" kern="1200" dirty="0">
+                          <a:solidFill>
+                            <a:schemeClr val="tx1"/>
+                          </a:solidFill>
+                          <a:effectLst/>
+                          <a:latin typeface="+mn-lt"/>
+                          <a:ea typeface="+mn-ea"/>
+                          <a:cs typeface="+mn-cs"/>
+                        </a:rPr>
+                        <a:t>Offer Products</a:t>
+                      </a:r>
+                    </a:p>
+                  </a:txBody>
+                  <a:tcPr anchor="ctr"/>
+                </a:tc>
+                <a:tc>
+                  <a:txBody>
+                    <a:bodyPr/>
+                    <a:lstStyle/>
+                    <a:p>
+                      <a:pPr marL="0" marR="0" lvl="0" indent="0" algn="l" defTabSz="914400" rtl="0" eaLnBrk="1" fontAlgn="auto" latinLnBrk="0" hangingPunct="1">
+                        <a:lnSpc>
+                          <a:spcPct val="100000"/>
+                        </a:lnSpc>
+                        <a:spcBef>
+                          <a:spcPts val="0"/>
+                        </a:spcBef>
+                        <a:spcAft>
+                          <a:spcPts val="0"/>
+                        </a:spcAft>
+                        <a:buClrTx/>
+                        <a:buSzTx/>
+                        <a:buFontTx/>
+                        <a:buNone/>
+                        <a:tabLst/>
+                        <a:defRPr/>
+                      </a:pPr>
+                      <a:r>
+                        <a:rPr lang="en-US" sz="1800" b="0" kern="1200" dirty="0">
+                          <a:solidFill>
+                            <a:schemeClr val="tx1"/>
+                          </a:solidFill>
+                          <a:effectLst/>
+                          <a:latin typeface="+mn-lt"/>
+                          <a:ea typeface="+mn-ea"/>
+                          <a:cs typeface="+mn-cs"/>
+                        </a:rPr>
+                        <a:t>Offer products or services to customers</a:t>
+                      </a:r>
+                    </a:p>
+                  </a:txBody>
+                  <a:tcPr anchor="ctr"/>
+                </a:tc>
+                <a:tc>
+                  <a:txBody>
+                    <a:bodyPr/>
+                    <a:lstStyle/>
+                    <a:p>
+                      <a:pPr marL="0" marR="0" lvl="0" indent="0" algn="l" defTabSz="914400" rtl="0" eaLnBrk="1" fontAlgn="auto" latinLnBrk="0" hangingPunct="1">
+                        <a:lnSpc>
+                          <a:spcPct val="100000"/>
+                        </a:lnSpc>
+                        <a:spcBef>
+                          <a:spcPts val="0"/>
+                        </a:spcBef>
+                        <a:spcAft>
+                          <a:spcPts val="0"/>
+                        </a:spcAft>
+                        <a:buClrTx/>
+                        <a:buSzTx/>
+                        <a:buFontTx/>
+                        <a:buNone/>
+                        <a:tabLst/>
+                        <a:defRPr/>
+                      </a:pPr>
+                      <a:r>
+                        <a:rPr lang="en-US" sz="1800" b="0" kern="1200" dirty="0">
+                          <a:solidFill>
+                            <a:schemeClr val="tx1"/>
+                          </a:solidFill>
+                          <a:effectLst/>
+                          <a:latin typeface="+mn-lt"/>
+                          <a:ea typeface="+mn-ea"/>
+                          <a:cs typeface="+mn-cs"/>
+                        </a:rPr>
+                        <a:t>A Vodafone agent calls to offer you a new phone plan</a:t>
+                      </a:r>
+                    </a:p>
+                  </a:txBody>
+                  <a:tcPr anchor="ctr"/>
+                </a:tc>
+                <a:extLst>
+                  <a:ext uri="{0D108BD9-81ED-4DB2-BD59-A6C34878D82A}">
+                    <a16:rowId xmlns:a16="http://schemas.microsoft.com/office/drawing/2014/main" val="3591840781"/>
+                  </a:ext>
+                </a:extLst>
+              </a:tr>
+              <a:tr h="648000">
+                <a:tc>
+                  <a:txBody>
+                    <a:bodyPr/>
+                    <a:lstStyle/>
+                    <a:p>
+                      <a:pPr marL="0" marR="0" lvl="0" indent="0" algn="l" defTabSz="914400" rtl="0" eaLnBrk="1" fontAlgn="auto" latinLnBrk="0" hangingPunct="1">
+                        <a:lnSpc>
+                          <a:spcPct val="100000"/>
+                        </a:lnSpc>
+                        <a:spcBef>
+                          <a:spcPts val="0"/>
+                        </a:spcBef>
+                        <a:spcAft>
+                          <a:spcPts val="0"/>
+                        </a:spcAft>
+                        <a:buClrTx/>
+                        <a:buSzTx/>
+                        <a:buFontTx/>
+                        <a:buNone/>
+                        <a:tabLst/>
+                        <a:defRPr/>
+                      </a:pPr>
+                      <a:r>
+                        <a:rPr lang="en-US" sz="1800" b="1" kern="1200" dirty="0">
+                          <a:solidFill>
+                            <a:schemeClr val="tx1"/>
+                          </a:solidFill>
+                          <a:effectLst/>
+                          <a:latin typeface="+mn-lt"/>
+                          <a:ea typeface="+mn-ea"/>
+                          <a:cs typeface="+mn-cs"/>
+                        </a:rPr>
+                        <a:t>Do Surveys</a:t>
+                      </a:r>
+                    </a:p>
+                  </a:txBody>
+                  <a:tcPr anchor="ctr"/>
+                </a:tc>
+                <a:tc>
+                  <a:txBody>
+                    <a:bodyPr/>
+                    <a:lstStyle/>
+                    <a:p>
+                      <a:pPr marL="0" marR="0" lvl="0" indent="0" algn="l" defTabSz="914400" rtl="0" eaLnBrk="1" fontAlgn="auto" latinLnBrk="0" hangingPunct="1">
+                        <a:lnSpc>
+                          <a:spcPct val="100000"/>
+                        </a:lnSpc>
+                        <a:spcBef>
+                          <a:spcPts val="0"/>
+                        </a:spcBef>
+                        <a:spcAft>
+                          <a:spcPts val="0"/>
+                        </a:spcAft>
+                        <a:buClrTx/>
+                        <a:buSzTx/>
+                        <a:buFontTx/>
+                        <a:buNone/>
+                        <a:tabLst/>
+                        <a:defRPr/>
+                      </a:pPr>
+                      <a:r>
+                        <a:rPr lang="en-US" sz="1800" b="0" kern="1200" dirty="0">
+                          <a:solidFill>
+                            <a:schemeClr val="tx1"/>
+                          </a:solidFill>
+                          <a:effectLst/>
+                          <a:latin typeface="+mn-lt"/>
+                          <a:ea typeface="+mn-ea"/>
+                          <a:cs typeface="+mn-cs"/>
+                        </a:rPr>
+                        <a:t>Ask customers for their feedback</a:t>
+                      </a:r>
+                    </a:p>
+                  </a:txBody>
+                  <a:tcPr anchor="ctr"/>
+                </a:tc>
+                <a:tc>
+                  <a:txBody>
+                    <a:bodyPr/>
+                    <a:lstStyle/>
+                    <a:p>
+                      <a:pPr marL="0" marR="0" lvl="0" indent="0" algn="l" defTabSz="914400" rtl="0" eaLnBrk="1" fontAlgn="auto" latinLnBrk="0" hangingPunct="1">
+                        <a:lnSpc>
+                          <a:spcPct val="100000"/>
+                        </a:lnSpc>
+                        <a:spcBef>
+                          <a:spcPts val="0"/>
+                        </a:spcBef>
+                        <a:spcAft>
+                          <a:spcPts val="0"/>
+                        </a:spcAft>
+                        <a:buClrTx/>
+                        <a:buSzTx/>
+                        <a:buFontTx/>
+                        <a:buNone/>
+                        <a:tabLst/>
+                        <a:defRPr/>
+                      </a:pPr>
+                      <a:r>
+                        <a:rPr lang="en-US" sz="1800" b="0" kern="1200" dirty="0">
+                          <a:solidFill>
+                            <a:schemeClr val="tx1"/>
+                          </a:solidFill>
+                          <a:effectLst/>
+                          <a:latin typeface="+mn-lt"/>
+                          <a:ea typeface="+mn-ea"/>
+                          <a:cs typeface="+mn-cs"/>
+                        </a:rPr>
+                        <a:t>You get a call asking about your recent visit to a café</a:t>
+                      </a:r>
+                    </a:p>
+                  </a:txBody>
+                  <a:tcPr anchor="ctr"/>
+                </a:tc>
+                <a:extLst>
+                  <a:ext uri="{0D108BD9-81ED-4DB2-BD59-A6C34878D82A}">
+                    <a16:rowId xmlns:a16="http://schemas.microsoft.com/office/drawing/2014/main" val="335389741"/>
+                  </a:ext>
+                </a:extLst>
+              </a:tr>
+            </a:tbl>
+          </a:graphicData>
+        </a:graphic>
+      </p:graphicFrame>
+      <p:sp>
+        <p:nvSpPr>
+          <p:cNvPr id="5" name="Slide Number Placeholder 5">
+            <a:extLst>
+              <a:ext uri="{FF2B5EF4-FFF2-40B4-BE49-F238E27FC236}">
+                <a16:creationId xmlns:a16="http://schemas.microsoft.com/office/drawing/2014/main" id="{D31ABF45-3B70-166E-2660-CBB2F229FF6F}"/>
+              </a:ext>
+            </a:extLst>
+          </p:cNvPr>
+          <p:cNvSpPr>
+            <a:spLocks noGrp="1"/>
+          </p:cNvSpPr>
+          <p:nvPr>
+            <p:ph type="sldNum" sz="quarter" idx="12"/>
+          </p:nvPr>
+        </p:nvSpPr>
+        <p:spPr>
+          <a:xfrm>
+            <a:off x="10373350" y="6356349"/>
+            <a:ext cx="987552" cy="365125"/>
+          </a:xfrm>
+        </p:spPr>
+        <p:txBody>
+          <a:bodyPr/>
+          <a:lstStyle/>
+          <a:p>
+            <a:fld id="{A49DFD55-3C28-40EF-9E31-A92D2E4017FF}" type="slidenum">
+              <a:rPr lang="en-US" smtClean="0"/>
+              <a:pPr/>
+              <a:t>4</a:t>
+            </a:fld>
+            <a:endParaRPr lang="en-US" dirty="0"/>
+          </a:p>
+        </p:txBody>
+      </p:sp>
+    </p:spTree>
+    <p:extLst>
+      <p:ext uri="{BB962C8B-B14F-4D97-AF65-F5344CB8AC3E}">
+        <p14:creationId xmlns:p14="http://schemas.microsoft.com/office/powerpoint/2010/main" val="3651869623"/>
+      </p:ext>
+    </p:extLst>
+  </p:cSld>
+  <p:clrMapOvr>
+    <a:masterClrMapping/>
+  </p:clrMapOvr>
+  <mc:AlternateContent xmlns:mc="http://schemas.openxmlformats.org/markup-compatibility/2006" xmlns:p14="http://schemas.microsoft.com/office/powerpoint/2010/main">
+    <mc:Choice Requires="p14">
+      <p:transition spd="slow">
+        <p14:reveal/>
+      </p:transition>
+    </mc:Choice>
+    <mc:Fallback xmlns="">
+      <p:transition spd="slow">
+        <p:fade/>
+      </p:transition>
+    </mc:Fallback>
+  </mc:AlternateContent>
+</p:sld>
+</file>
+
+<file path=ppt/slides/slide5.xml><?xml version="1.0" encoding="utf-8"?>
+<p:sld xmlns:a="http://schemas.openxmlformats.org/drawingml/2006/main" xmlns:r="http://schemas.openxmlformats.org/officeDocument/2006/relationships" xmlns:p="http://schemas.openxmlformats.org/presentationml/2006/main">
+  <p:cSld>
+    <p:spTree>
+      <p:nvGrpSpPr>
         <p:cNvPr id="1" name=""/>
         <p:cNvGrpSpPr/>
         <p:nvPr/>
@@ -8505,7 +9185,7 @@
             <a:fld id="{A49DFD55-3C28-40EF-9E31-A92D2E4017FF}" type="slidenum">
               <a:rPr lang="en-US" smtClean="0"/>
               <a:pPr/>
-              <a:t>4</a:t>
+              <a:t>5</a:t>
             </a:fld>
             <a:endParaRPr lang="en-US" dirty="0"/>
           </a:p>
@@ -9399,858 +10079,6 @@
 </p:sld>
 </file>
 
-<file path=ppt/slides/slide5.xml><?xml version="1.0" encoding="utf-8"?>
-<p:sld xmlns:a="http://schemas.openxmlformats.org/drawingml/2006/main" xmlns:r="http://schemas.openxmlformats.org/officeDocument/2006/relationships" xmlns:p="http://schemas.openxmlformats.org/presentationml/2006/main">
-  <p:cSld>
-    <p:spTree>
-      <p:nvGrpSpPr>
-        <p:cNvPr id="1" name="">
-          <a:extLst>
-            <a:ext uri="{FF2B5EF4-FFF2-40B4-BE49-F238E27FC236}">
-              <a16:creationId xmlns:a16="http://schemas.microsoft.com/office/drawing/2014/main" id="{78478993-7F33-5FE6-4CFB-FEAA8128370E}"/>
-            </a:ext>
-          </a:extLst>
-        </p:cNvPr>
-        <p:cNvGrpSpPr/>
-        <p:nvPr/>
-      </p:nvGrpSpPr>
-      <p:grpSpPr>
-        <a:xfrm>
-          <a:off x="0" y="0"/>
-          <a:ext cx="0" cy="0"/>
-          <a:chOff x="0" y="0"/>
-          <a:chExt cx="0" cy="0"/>
-        </a:xfrm>
-      </p:grpSpPr>
-      <p:sp>
-        <p:nvSpPr>
-          <p:cNvPr id="8" name="Title 2">
-            <a:extLst>
-              <a:ext uri="{FF2B5EF4-FFF2-40B4-BE49-F238E27FC236}">
-                <a16:creationId xmlns:a16="http://schemas.microsoft.com/office/drawing/2014/main" id="{3A06695E-6E03-C518-2B14-01E2B6AD6509}"/>
-              </a:ext>
-            </a:extLst>
-          </p:cNvPr>
-          <p:cNvSpPr>
-            <a:spLocks noGrp="1"/>
-          </p:cNvSpPr>
-          <p:nvPr>
-            <p:ph type="title"/>
-          </p:nvPr>
-        </p:nvSpPr>
-        <p:spPr>
-          <a:xfrm>
-            <a:off x="838200" y="353550"/>
-            <a:ext cx="10515600" cy="1325563"/>
-          </a:xfrm>
-        </p:spPr>
-        <p:txBody>
-          <a:bodyPr anchor="b"/>
-          <a:lstStyle/>
-          <a:p>
-            <a:r>
-              <a:rPr lang="en-US" b="1" dirty="0"/>
-              <a:t>Key Functions</a:t>
-            </a:r>
-            <a:br>
-              <a:rPr lang="en-US" dirty="0"/>
-            </a:br>
-            <a:r>
-              <a:rPr lang="en-US" sz="2400" dirty="0"/>
-              <a:t>of Contact Center</a:t>
-            </a:r>
-            <a:endParaRPr lang="en-US" dirty="0"/>
-          </a:p>
-        </p:txBody>
-      </p:sp>
-      <p:graphicFrame>
-        <p:nvGraphicFramePr>
-          <p:cNvPr id="13" name="Table Placeholder 2">
-            <a:extLst>
-              <a:ext uri="{FF2B5EF4-FFF2-40B4-BE49-F238E27FC236}">
-                <a16:creationId xmlns:a16="http://schemas.microsoft.com/office/drawing/2014/main" id="{26A85F69-7190-083C-44A3-20343C811980}"/>
-              </a:ext>
-            </a:extLst>
-          </p:cNvPr>
-          <p:cNvGraphicFramePr>
-            <a:graphicFrameLocks noGrp="1"/>
-          </p:cNvGraphicFramePr>
-          <p:nvPr>
-            <p:ph type="tbl" sz="quarter" idx="14"/>
-            <p:extLst>
-              <p:ext uri="{D42A27DB-BD31-4B8C-83A1-F6EECF244321}">
-                <p14:modId xmlns:p14="http://schemas.microsoft.com/office/powerpoint/2010/main" val="209561069"/>
-              </p:ext>
-            </p:extLst>
-          </p:nvPr>
-        </p:nvGraphicFramePr>
-        <p:xfrm>
-          <a:off x="838200" y="2111375"/>
-          <a:ext cx="10476000" cy="3960000"/>
-        </p:xfrm>
-        <a:graphic>
-          <a:graphicData uri="http://schemas.openxmlformats.org/drawingml/2006/table">
-            <a:tbl>
-              <a:tblPr firstRow="1" bandRow="1">
-                <a:tableStyleId>{7E9639D4-E3E2-4D34-9284-5A2195B3D0D7}</a:tableStyleId>
-              </a:tblPr>
-              <a:tblGrid>
-                <a:gridCol w="2124000">
-                  <a:extLst>
-                    <a:ext uri="{9D8B030D-6E8A-4147-A177-3AD203B41FA5}">
-                      <a16:colId xmlns:a16="http://schemas.microsoft.com/office/drawing/2014/main" val="127040821"/>
-                    </a:ext>
-                  </a:extLst>
-                </a:gridCol>
-                <a:gridCol w="4176000">
-                  <a:extLst>
-                    <a:ext uri="{9D8B030D-6E8A-4147-A177-3AD203B41FA5}">
-                      <a16:colId xmlns:a16="http://schemas.microsoft.com/office/drawing/2014/main" val="149845700"/>
-                    </a:ext>
-                  </a:extLst>
-                </a:gridCol>
-                <a:gridCol w="4176000">
-                  <a:extLst>
-                    <a:ext uri="{9D8B030D-6E8A-4147-A177-3AD203B41FA5}">
-                      <a16:colId xmlns:a16="http://schemas.microsoft.com/office/drawing/2014/main" val="3119692462"/>
-                    </a:ext>
-                  </a:extLst>
-                </a:gridCol>
-              </a:tblGrid>
-              <a:tr h="720000">
-                <a:tc>
-                  <a:txBody>
-                    <a:bodyPr/>
-                    <a:lstStyle/>
-                    <a:p>
-                      <a:pPr algn="l"/>
-                      <a:r>
-                        <a:rPr lang="en-US" sz="1800" b="1" kern="1200" dirty="0">
-                          <a:solidFill>
-                            <a:schemeClr val="bg1"/>
-                          </a:solidFill>
-                          <a:effectLst/>
-                          <a:latin typeface="+mn-lt"/>
-                          <a:ea typeface="+mn-ea"/>
-                          <a:cs typeface="+mn-cs"/>
-                        </a:rPr>
-                        <a:t>FUNCTION</a:t>
-                      </a:r>
-                    </a:p>
-                  </a:txBody>
-                  <a:tcPr anchor="ctr"/>
-                </a:tc>
-                <a:tc>
-                  <a:txBody>
-                    <a:bodyPr/>
-                    <a:lstStyle/>
-                    <a:p>
-                      <a:pPr marL="0" marR="0" lvl="0" indent="0" algn="l" defTabSz="914400" rtl="0" eaLnBrk="1" fontAlgn="auto" latinLnBrk="0" hangingPunct="1">
-                        <a:lnSpc>
-                          <a:spcPct val="100000"/>
-                        </a:lnSpc>
-                        <a:spcBef>
-                          <a:spcPts val="0"/>
-                        </a:spcBef>
-                        <a:spcAft>
-                          <a:spcPts val="0"/>
-                        </a:spcAft>
-                        <a:buClrTx/>
-                        <a:buSzTx/>
-                        <a:buFontTx/>
-                        <a:buNone/>
-                        <a:tabLst/>
-                        <a:defRPr/>
-                      </a:pPr>
-                      <a:r>
-                        <a:rPr lang="en-US" sz="1800" b="1" kern="1200" dirty="0">
-                          <a:solidFill>
-                            <a:schemeClr val="bg1"/>
-                          </a:solidFill>
-                          <a:effectLst/>
-                          <a:latin typeface="+mn-lt"/>
-                          <a:ea typeface="+mn-ea"/>
-                          <a:cs typeface="+mn-cs"/>
-                        </a:rPr>
-                        <a:t>WHAT IT MEANS</a:t>
-                      </a:r>
-                    </a:p>
-                  </a:txBody>
-                  <a:tcPr anchor="ctr"/>
-                </a:tc>
-                <a:tc>
-                  <a:txBody>
-                    <a:bodyPr/>
-                    <a:lstStyle/>
-                    <a:p>
-                      <a:pPr algn="l"/>
-                      <a:r>
-                        <a:rPr lang="en-US" b="1" dirty="0"/>
-                        <a:t>REAL-LIFE EXAMPLE</a:t>
-                      </a:r>
-                    </a:p>
-                  </a:txBody>
-                  <a:tcPr anchor="ctr"/>
-                </a:tc>
-                <a:extLst>
-                  <a:ext uri="{0D108BD9-81ED-4DB2-BD59-A6C34878D82A}">
-                    <a16:rowId xmlns:a16="http://schemas.microsoft.com/office/drawing/2014/main" val="3298013591"/>
-                  </a:ext>
-                </a:extLst>
-              </a:tr>
-              <a:tr h="648000">
-                <a:tc>
-                  <a:txBody>
-                    <a:bodyPr/>
-                    <a:lstStyle/>
-                    <a:p>
-                      <a:pPr algn="l"/>
-                      <a:r>
-                        <a:rPr lang="en-US" sz="1800" b="1" kern="1200" dirty="0">
-                          <a:solidFill>
-                            <a:schemeClr val="tx1"/>
-                          </a:solidFill>
-                          <a:effectLst/>
-                          <a:latin typeface="+mn-lt"/>
-                          <a:ea typeface="+mn-ea"/>
-                          <a:cs typeface="+mn-cs"/>
-                        </a:rPr>
-                        <a:t>Provide Services</a:t>
-                      </a:r>
-                    </a:p>
-                  </a:txBody>
-                  <a:tcPr anchor="ctr"/>
-                </a:tc>
-                <a:tc>
-                  <a:txBody>
-                    <a:bodyPr/>
-                    <a:lstStyle/>
-                    <a:p>
-                      <a:pPr marL="0" marR="0" lvl="0" indent="0" algn="l" defTabSz="914400" rtl="0" eaLnBrk="1" fontAlgn="auto" latinLnBrk="0" hangingPunct="1">
-                        <a:lnSpc>
-                          <a:spcPct val="100000"/>
-                        </a:lnSpc>
-                        <a:spcBef>
-                          <a:spcPts val="0"/>
-                        </a:spcBef>
-                        <a:spcAft>
-                          <a:spcPts val="0"/>
-                        </a:spcAft>
-                        <a:buClrTx/>
-                        <a:buSzTx/>
-                        <a:buFontTx/>
-                        <a:buNone/>
-                        <a:tabLst/>
-                        <a:defRPr/>
-                      </a:pPr>
-                      <a:r>
-                        <a:rPr lang="en-US" sz="1800" b="0" kern="1200" dirty="0">
-                          <a:solidFill>
-                            <a:schemeClr val="tx1"/>
-                          </a:solidFill>
-                          <a:effectLst/>
-                          <a:latin typeface="+mn-lt"/>
-                          <a:ea typeface="+mn-ea"/>
-                          <a:cs typeface="+mn-cs"/>
-                        </a:rPr>
-                        <a:t>Help customers use or manage services</a:t>
-                      </a:r>
-                    </a:p>
-                  </a:txBody>
-                  <a:tcPr anchor="ctr"/>
-                </a:tc>
-                <a:tc>
-                  <a:txBody>
-                    <a:bodyPr/>
-                    <a:lstStyle/>
-                    <a:p>
-                      <a:pPr marL="0" marR="0" lvl="0" indent="0" algn="l" defTabSz="914400" rtl="0" eaLnBrk="1" fontAlgn="auto" latinLnBrk="0" hangingPunct="1">
-                        <a:lnSpc>
-                          <a:spcPct val="100000"/>
-                        </a:lnSpc>
-                        <a:spcBef>
-                          <a:spcPts val="0"/>
-                        </a:spcBef>
-                        <a:spcAft>
-                          <a:spcPts val="0"/>
-                        </a:spcAft>
-                        <a:buClrTx/>
-                        <a:buSzTx/>
-                        <a:buFontTx/>
-                        <a:buNone/>
-                        <a:tabLst/>
-                        <a:defRPr/>
-                      </a:pPr>
-                      <a:r>
-                        <a:rPr lang="en-US" sz="1800" b="0" kern="1200" dirty="0">
-                          <a:solidFill>
-                            <a:schemeClr val="tx1"/>
-                          </a:solidFill>
-                          <a:effectLst/>
-                          <a:latin typeface="+mn-lt"/>
-                          <a:ea typeface="+mn-ea"/>
-                          <a:cs typeface="+mn-cs"/>
-                        </a:rPr>
-                        <a:t>Recharging your mobile balance by calling customer service</a:t>
-                      </a:r>
-                    </a:p>
-                  </a:txBody>
-                  <a:tcPr anchor="ctr"/>
-                </a:tc>
-                <a:extLst>
-                  <a:ext uri="{0D108BD9-81ED-4DB2-BD59-A6C34878D82A}">
-                    <a16:rowId xmlns:a16="http://schemas.microsoft.com/office/drawing/2014/main" val="3873867931"/>
-                  </a:ext>
-                </a:extLst>
-              </a:tr>
-              <a:tr h="648000">
-                <a:tc>
-                  <a:txBody>
-                    <a:bodyPr/>
-                    <a:lstStyle/>
-                    <a:p>
-                      <a:pPr marL="0" marR="0" lvl="0" indent="0" algn="l" defTabSz="914400" rtl="0" eaLnBrk="1" fontAlgn="auto" latinLnBrk="0" hangingPunct="1">
-                        <a:lnSpc>
-                          <a:spcPct val="100000"/>
-                        </a:lnSpc>
-                        <a:spcBef>
-                          <a:spcPts val="0"/>
-                        </a:spcBef>
-                        <a:spcAft>
-                          <a:spcPts val="0"/>
-                        </a:spcAft>
-                        <a:buClrTx/>
-                        <a:buSzTx/>
-                        <a:buFontTx/>
-                        <a:buNone/>
-                        <a:tabLst/>
-                        <a:defRPr/>
-                      </a:pPr>
-                      <a:r>
-                        <a:rPr lang="en-US" sz="1800" b="1" kern="1200" dirty="0">
-                          <a:solidFill>
-                            <a:schemeClr val="tx1"/>
-                          </a:solidFill>
-                          <a:effectLst/>
-                          <a:latin typeface="+mn-lt"/>
-                          <a:ea typeface="+mn-ea"/>
-                          <a:cs typeface="+mn-cs"/>
-                        </a:rPr>
-                        <a:t>Technical Support</a:t>
-                      </a:r>
-                    </a:p>
-                  </a:txBody>
-                  <a:tcPr anchor="ctr"/>
-                </a:tc>
-                <a:tc>
-                  <a:txBody>
-                    <a:bodyPr/>
-                    <a:lstStyle/>
-                    <a:p>
-                      <a:pPr marL="0" marR="0" lvl="0" indent="0" algn="l" defTabSz="914400" rtl="0" eaLnBrk="1" fontAlgn="auto" latinLnBrk="0" hangingPunct="1">
-                        <a:lnSpc>
-                          <a:spcPct val="100000"/>
-                        </a:lnSpc>
-                        <a:spcBef>
-                          <a:spcPts val="0"/>
-                        </a:spcBef>
-                        <a:spcAft>
-                          <a:spcPts val="0"/>
-                        </a:spcAft>
-                        <a:buClrTx/>
-                        <a:buSzTx/>
-                        <a:buFontTx/>
-                        <a:buNone/>
-                        <a:tabLst/>
-                        <a:defRPr/>
-                      </a:pPr>
-                      <a:r>
-                        <a:rPr lang="en-US" sz="1800" b="0" kern="1200" dirty="0">
-                          <a:solidFill>
-                            <a:schemeClr val="tx1"/>
-                          </a:solidFill>
-                          <a:effectLst/>
-                          <a:latin typeface="+mn-lt"/>
-                          <a:ea typeface="+mn-ea"/>
-                          <a:cs typeface="+mn-cs"/>
-                        </a:rPr>
-                        <a:t>Fix a problem with a product or service</a:t>
-                      </a:r>
-                    </a:p>
-                  </a:txBody>
-                  <a:tcPr anchor="ctr"/>
-                </a:tc>
-                <a:tc>
-                  <a:txBody>
-                    <a:bodyPr/>
-                    <a:lstStyle/>
-                    <a:p>
-                      <a:pPr marL="0" marR="0" lvl="0" indent="0" algn="l" defTabSz="914400" rtl="0" eaLnBrk="1" fontAlgn="auto" latinLnBrk="0" hangingPunct="1">
-                        <a:lnSpc>
-                          <a:spcPct val="100000"/>
-                        </a:lnSpc>
-                        <a:spcBef>
-                          <a:spcPts val="0"/>
-                        </a:spcBef>
-                        <a:spcAft>
-                          <a:spcPts val="0"/>
-                        </a:spcAft>
-                        <a:buClrTx/>
-                        <a:buSzTx/>
-                        <a:buFontTx/>
-                        <a:buNone/>
-                        <a:tabLst/>
-                        <a:defRPr/>
-                      </a:pPr>
-                      <a:r>
-                        <a:rPr lang="en-US" sz="1800" b="0" kern="1200" dirty="0">
-                          <a:solidFill>
-                            <a:schemeClr val="tx1"/>
-                          </a:solidFill>
-                          <a:effectLst/>
-                          <a:latin typeface="+mn-lt"/>
-                          <a:ea typeface="+mn-ea"/>
-                          <a:cs typeface="+mn-cs"/>
-                        </a:rPr>
-                        <a:t>Getting help to fix your home internet connection</a:t>
-                      </a:r>
-                    </a:p>
-                  </a:txBody>
-                  <a:tcPr anchor="ctr"/>
-                </a:tc>
-                <a:extLst>
-                  <a:ext uri="{0D108BD9-81ED-4DB2-BD59-A6C34878D82A}">
-                    <a16:rowId xmlns:a16="http://schemas.microsoft.com/office/drawing/2014/main" val="85209771"/>
-                  </a:ext>
-                </a:extLst>
-              </a:tr>
-              <a:tr h="648000">
-                <a:tc>
-                  <a:txBody>
-                    <a:bodyPr/>
-                    <a:lstStyle/>
-                    <a:p>
-                      <a:pPr marL="0" marR="0" lvl="0" indent="0" algn="l" defTabSz="914400" rtl="0" eaLnBrk="1" fontAlgn="auto" latinLnBrk="0" hangingPunct="1">
-                        <a:lnSpc>
-                          <a:spcPct val="100000"/>
-                        </a:lnSpc>
-                        <a:spcBef>
-                          <a:spcPts val="0"/>
-                        </a:spcBef>
-                        <a:spcAft>
-                          <a:spcPts val="0"/>
-                        </a:spcAft>
-                        <a:buClrTx/>
-                        <a:buSzTx/>
-                        <a:buFontTx/>
-                        <a:buNone/>
-                        <a:tabLst/>
-                        <a:defRPr/>
-                      </a:pPr>
-                      <a:r>
-                        <a:rPr lang="en-US" sz="1800" b="1" kern="1200" dirty="0">
-                          <a:solidFill>
-                            <a:schemeClr val="tx1"/>
-                          </a:solidFill>
-                          <a:effectLst/>
-                          <a:latin typeface="+mn-lt"/>
-                          <a:ea typeface="+mn-ea"/>
-                          <a:cs typeface="+mn-cs"/>
-                        </a:rPr>
-                        <a:t>Handle Complaints</a:t>
-                      </a:r>
-                    </a:p>
-                  </a:txBody>
-                  <a:tcPr anchor="ctr"/>
-                </a:tc>
-                <a:tc>
-                  <a:txBody>
-                    <a:bodyPr/>
-                    <a:lstStyle/>
-                    <a:p>
-                      <a:pPr marL="0" marR="0" lvl="0" indent="0" algn="l" defTabSz="914400" rtl="0" eaLnBrk="1" fontAlgn="auto" latinLnBrk="0" hangingPunct="1">
-                        <a:lnSpc>
-                          <a:spcPct val="100000"/>
-                        </a:lnSpc>
-                        <a:spcBef>
-                          <a:spcPts val="0"/>
-                        </a:spcBef>
-                        <a:spcAft>
-                          <a:spcPts val="0"/>
-                        </a:spcAft>
-                        <a:buClrTx/>
-                        <a:buSzTx/>
-                        <a:buFontTx/>
-                        <a:buNone/>
-                        <a:tabLst/>
-                        <a:defRPr/>
-                      </a:pPr>
-                      <a:r>
-                        <a:rPr lang="en-US" sz="1800" b="0" kern="1200" dirty="0">
-                          <a:solidFill>
-                            <a:schemeClr val="tx1"/>
-                          </a:solidFill>
-                          <a:effectLst/>
-                          <a:latin typeface="+mn-lt"/>
-                          <a:ea typeface="+mn-ea"/>
-                          <a:cs typeface="+mn-cs"/>
-                        </a:rPr>
-                        <a:t>Listen to problems and find solutions</a:t>
-                      </a:r>
-                    </a:p>
-                  </a:txBody>
-                  <a:tcPr anchor="ctr"/>
-                </a:tc>
-                <a:tc>
-                  <a:txBody>
-                    <a:bodyPr/>
-                    <a:lstStyle/>
-                    <a:p>
-                      <a:pPr marL="0" marR="0" lvl="0" indent="0" algn="l" defTabSz="914400" rtl="0" eaLnBrk="1" fontAlgn="auto" latinLnBrk="0" hangingPunct="1">
-                        <a:lnSpc>
-                          <a:spcPct val="100000"/>
-                        </a:lnSpc>
-                        <a:spcBef>
-                          <a:spcPts val="0"/>
-                        </a:spcBef>
-                        <a:spcAft>
-                          <a:spcPts val="0"/>
-                        </a:spcAft>
-                        <a:buClrTx/>
-                        <a:buSzTx/>
-                        <a:buFontTx/>
-                        <a:buNone/>
-                        <a:tabLst/>
-                        <a:defRPr/>
-                      </a:pPr>
-                      <a:r>
-                        <a:rPr lang="en-US" sz="1800" b="0" kern="1200" dirty="0">
-                          <a:solidFill>
-                            <a:schemeClr val="tx1"/>
-                          </a:solidFill>
-                          <a:effectLst/>
-                          <a:latin typeface="+mn-lt"/>
-                          <a:ea typeface="+mn-ea"/>
-                          <a:cs typeface="+mn-cs"/>
-                        </a:rPr>
-                        <a:t>A customer complains about a wrong bill and the agent fixes it</a:t>
-                      </a:r>
-                    </a:p>
-                  </a:txBody>
-                  <a:tcPr anchor="ctr"/>
-                </a:tc>
-                <a:extLst>
-                  <a:ext uri="{0D108BD9-81ED-4DB2-BD59-A6C34878D82A}">
-                    <a16:rowId xmlns:a16="http://schemas.microsoft.com/office/drawing/2014/main" val="4061031278"/>
-                  </a:ext>
-                </a:extLst>
-              </a:tr>
-              <a:tr h="648000">
-                <a:tc>
-                  <a:txBody>
-                    <a:bodyPr/>
-                    <a:lstStyle/>
-                    <a:p>
-                      <a:pPr marL="0" marR="0" lvl="0" indent="0" algn="l" defTabSz="914400" rtl="0" eaLnBrk="1" fontAlgn="auto" latinLnBrk="0" hangingPunct="1">
-                        <a:lnSpc>
-                          <a:spcPct val="100000"/>
-                        </a:lnSpc>
-                        <a:spcBef>
-                          <a:spcPts val="0"/>
-                        </a:spcBef>
-                        <a:spcAft>
-                          <a:spcPts val="0"/>
-                        </a:spcAft>
-                        <a:buClrTx/>
-                        <a:buSzTx/>
-                        <a:buFontTx/>
-                        <a:buNone/>
-                        <a:tabLst/>
-                        <a:defRPr/>
-                      </a:pPr>
-                      <a:r>
-                        <a:rPr lang="en-US" sz="1800" b="1" kern="1200" dirty="0">
-                          <a:solidFill>
-                            <a:schemeClr val="tx1"/>
-                          </a:solidFill>
-                          <a:effectLst/>
-                          <a:latin typeface="+mn-lt"/>
-                          <a:ea typeface="+mn-ea"/>
-                          <a:cs typeface="+mn-cs"/>
-                        </a:rPr>
-                        <a:t>Offer Products</a:t>
-                      </a:r>
-                    </a:p>
-                  </a:txBody>
-                  <a:tcPr anchor="ctr"/>
-                </a:tc>
-                <a:tc>
-                  <a:txBody>
-                    <a:bodyPr/>
-                    <a:lstStyle/>
-                    <a:p>
-                      <a:pPr marL="0" marR="0" lvl="0" indent="0" algn="l" defTabSz="914400" rtl="0" eaLnBrk="1" fontAlgn="auto" latinLnBrk="0" hangingPunct="1">
-                        <a:lnSpc>
-                          <a:spcPct val="100000"/>
-                        </a:lnSpc>
-                        <a:spcBef>
-                          <a:spcPts val="0"/>
-                        </a:spcBef>
-                        <a:spcAft>
-                          <a:spcPts val="0"/>
-                        </a:spcAft>
-                        <a:buClrTx/>
-                        <a:buSzTx/>
-                        <a:buFontTx/>
-                        <a:buNone/>
-                        <a:tabLst/>
-                        <a:defRPr/>
-                      </a:pPr>
-                      <a:r>
-                        <a:rPr lang="en-US" sz="1800" b="0" kern="1200" dirty="0">
-                          <a:solidFill>
-                            <a:schemeClr val="tx1"/>
-                          </a:solidFill>
-                          <a:effectLst/>
-                          <a:latin typeface="+mn-lt"/>
-                          <a:ea typeface="+mn-ea"/>
-                          <a:cs typeface="+mn-cs"/>
-                        </a:rPr>
-                        <a:t>Offer products or services to customers</a:t>
-                      </a:r>
-                    </a:p>
-                  </a:txBody>
-                  <a:tcPr anchor="ctr"/>
-                </a:tc>
-                <a:tc>
-                  <a:txBody>
-                    <a:bodyPr/>
-                    <a:lstStyle/>
-                    <a:p>
-                      <a:pPr marL="0" marR="0" lvl="0" indent="0" algn="l" defTabSz="914400" rtl="0" eaLnBrk="1" fontAlgn="auto" latinLnBrk="0" hangingPunct="1">
-                        <a:lnSpc>
-                          <a:spcPct val="100000"/>
-                        </a:lnSpc>
-                        <a:spcBef>
-                          <a:spcPts val="0"/>
-                        </a:spcBef>
-                        <a:spcAft>
-                          <a:spcPts val="0"/>
-                        </a:spcAft>
-                        <a:buClrTx/>
-                        <a:buSzTx/>
-                        <a:buFontTx/>
-                        <a:buNone/>
-                        <a:tabLst/>
-                        <a:defRPr/>
-                      </a:pPr>
-                      <a:r>
-                        <a:rPr lang="en-US" sz="1800" b="0" kern="1200" dirty="0">
-                          <a:solidFill>
-                            <a:schemeClr val="tx1"/>
-                          </a:solidFill>
-                          <a:effectLst/>
-                          <a:latin typeface="+mn-lt"/>
-                          <a:ea typeface="+mn-ea"/>
-                          <a:cs typeface="+mn-cs"/>
-                        </a:rPr>
-                        <a:t>A Vodafone agent calls to offer you a new phone plan</a:t>
-                      </a:r>
-                    </a:p>
-                  </a:txBody>
-                  <a:tcPr anchor="ctr"/>
-                </a:tc>
-                <a:extLst>
-                  <a:ext uri="{0D108BD9-81ED-4DB2-BD59-A6C34878D82A}">
-                    <a16:rowId xmlns:a16="http://schemas.microsoft.com/office/drawing/2014/main" val="3591840781"/>
-                  </a:ext>
-                </a:extLst>
-              </a:tr>
-              <a:tr h="648000">
-                <a:tc>
-                  <a:txBody>
-                    <a:bodyPr/>
-                    <a:lstStyle/>
-                    <a:p>
-                      <a:pPr marL="0" marR="0" lvl="0" indent="0" algn="l" defTabSz="914400" rtl="0" eaLnBrk="1" fontAlgn="auto" latinLnBrk="0" hangingPunct="1">
-                        <a:lnSpc>
-                          <a:spcPct val="100000"/>
-                        </a:lnSpc>
-                        <a:spcBef>
-                          <a:spcPts val="0"/>
-                        </a:spcBef>
-                        <a:spcAft>
-                          <a:spcPts val="0"/>
-                        </a:spcAft>
-                        <a:buClrTx/>
-                        <a:buSzTx/>
-                        <a:buFontTx/>
-                        <a:buNone/>
-                        <a:tabLst/>
-                        <a:defRPr/>
-                      </a:pPr>
-                      <a:r>
-                        <a:rPr lang="en-US" sz="1800" b="1" kern="1200" dirty="0">
-                          <a:solidFill>
-                            <a:schemeClr val="tx1"/>
-                          </a:solidFill>
-                          <a:effectLst/>
-                          <a:latin typeface="+mn-lt"/>
-                          <a:ea typeface="+mn-ea"/>
-                          <a:cs typeface="+mn-cs"/>
-                        </a:rPr>
-                        <a:t>Do Surveys</a:t>
-                      </a:r>
-                    </a:p>
-                  </a:txBody>
-                  <a:tcPr anchor="ctr"/>
-                </a:tc>
-                <a:tc>
-                  <a:txBody>
-                    <a:bodyPr/>
-                    <a:lstStyle/>
-                    <a:p>
-                      <a:pPr marL="0" marR="0" lvl="0" indent="0" algn="l" defTabSz="914400" rtl="0" eaLnBrk="1" fontAlgn="auto" latinLnBrk="0" hangingPunct="1">
-                        <a:lnSpc>
-                          <a:spcPct val="100000"/>
-                        </a:lnSpc>
-                        <a:spcBef>
-                          <a:spcPts val="0"/>
-                        </a:spcBef>
-                        <a:spcAft>
-                          <a:spcPts val="0"/>
-                        </a:spcAft>
-                        <a:buClrTx/>
-                        <a:buSzTx/>
-                        <a:buFontTx/>
-                        <a:buNone/>
-                        <a:tabLst/>
-                        <a:defRPr/>
-                      </a:pPr>
-                      <a:r>
-                        <a:rPr lang="en-US" sz="1800" b="0" kern="1200" dirty="0">
-                          <a:solidFill>
-                            <a:schemeClr val="tx1"/>
-                          </a:solidFill>
-                          <a:effectLst/>
-                          <a:latin typeface="+mn-lt"/>
-                          <a:ea typeface="+mn-ea"/>
-                          <a:cs typeface="+mn-cs"/>
-                        </a:rPr>
-                        <a:t>Ask customers for their feedback</a:t>
-                      </a:r>
-                    </a:p>
-                  </a:txBody>
-                  <a:tcPr anchor="ctr"/>
-                </a:tc>
-                <a:tc>
-                  <a:txBody>
-                    <a:bodyPr/>
-                    <a:lstStyle/>
-                    <a:p>
-                      <a:pPr marL="0" marR="0" lvl="0" indent="0" algn="l" defTabSz="914400" rtl="0" eaLnBrk="1" fontAlgn="auto" latinLnBrk="0" hangingPunct="1">
-                        <a:lnSpc>
-                          <a:spcPct val="100000"/>
-                        </a:lnSpc>
-                        <a:spcBef>
-                          <a:spcPts val="0"/>
-                        </a:spcBef>
-                        <a:spcAft>
-                          <a:spcPts val="0"/>
-                        </a:spcAft>
-                        <a:buClrTx/>
-                        <a:buSzTx/>
-                        <a:buFontTx/>
-                        <a:buNone/>
-                        <a:tabLst/>
-                        <a:defRPr/>
-                      </a:pPr>
-                      <a:r>
-                        <a:rPr lang="en-US" sz="1800" b="0" kern="1200" dirty="0">
-                          <a:solidFill>
-                            <a:schemeClr val="tx1"/>
-                          </a:solidFill>
-                          <a:effectLst/>
-                          <a:latin typeface="+mn-lt"/>
-                          <a:ea typeface="+mn-ea"/>
-                          <a:cs typeface="+mn-cs"/>
-                        </a:rPr>
-                        <a:t>You get a call asking about your recent visit to a café</a:t>
-                      </a:r>
-                    </a:p>
-                  </a:txBody>
-                  <a:tcPr anchor="ctr"/>
-                </a:tc>
-                <a:extLst>
-                  <a:ext uri="{0D108BD9-81ED-4DB2-BD59-A6C34878D82A}">
-                    <a16:rowId xmlns:a16="http://schemas.microsoft.com/office/drawing/2014/main" val="335389741"/>
-                  </a:ext>
-                </a:extLst>
-              </a:tr>
-            </a:tbl>
-          </a:graphicData>
-        </a:graphic>
-      </p:graphicFrame>
-      <p:sp>
-        <p:nvSpPr>
-          <p:cNvPr id="5" name="Slide Number Placeholder 5">
-            <a:extLst>
-              <a:ext uri="{FF2B5EF4-FFF2-40B4-BE49-F238E27FC236}">
-                <a16:creationId xmlns:a16="http://schemas.microsoft.com/office/drawing/2014/main" id="{D31ABF45-3B70-166E-2660-CBB2F229FF6F}"/>
-              </a:ext>
-            </a:extLst>
-          </p:cNvPr>
-          <p:cNvSpPr>
-            <a:spLocks noGrp="1"/>
-          </p:cNvSpPr>
-          <p:nvPr>
-            <p:ph type="sldNum" sz="quarter" idx="12"/>
-          </p:nvPr>
-        </p:nvSpPr>
-        <p:spPr>
-          <a:xfrm>
-            <a:off x="10373350" y="6356349"/>
-            <a:ext cx="987552" cy="365125"/>
-          </a:xfrm>
-        </p:spPr>
-        <p:txBody>
-          <a:bodyPr/>
-          <a:lstStyle/>
-          <a:p>
-            <a:fld id="{A49DFD55-3C28-40EF-9E31-A92D2E4017FF}" type="slidenum">
-              <a:rPr lang="en-US" smtClean="0"/>
-              <a:pPr/>
-              <a:t>5</a:t>
-            </a:fld>
-            <a:endParaRPr lang="en-US" dirty="0"/>
-          </a:p>
-        </p:txBody>
-      </p:sp>
-    </p:spTree>
-    <p:extLst>
-      <p:ext uri="{BB962C8B-B14F-4D97-AF65-F5344CB8AC3E}">
-        <p14:creationId xmlns:p14="http://schemas.microsoft.com/office/powerpoint/2010/main" val="3651869623"/>
-      </p:ext>
-    </p:extLst>
-  </p:cSld>
-  <p:clrMapOvr>
-    <a:masterClrMapping/>
-  </p:clrMapOvr>
-  <mc:AlternateContent xmlns:mc="http://schemas.openxmlformats.org/markup-compatibility/2006" xmlns:p14="http://schemas.microsoft.com/office/powerpoint/2010/main">
-    <mc:Choice Requires="p14">
-      <p:transition spd="slow">
-        <p14:reveal/>
-      </p:transition>
-    </mc:Choice>
-    <mc:Fallback xmlns="">
-      <p:transition spd="slow">
-        <p:fade/>
-      </p:transition>
-    </mc:Fallback>
-  </mc:AlternateContent>
-</p:sld>
-</file>
-
 <file path=ppt/slides/slide6.xml><?xml version="1.0" encoding="utf-8"?>
 <p:sld xmlns:a="http://schemas.openxmlformats.org/drawingml/2006/main" xmlns:r="http://schemas.openxmlformats.org/officeDocument/2006/relationships" xmlns:p="http://schemas.openxmlformats.org/presentationml/2006/main">
   <p:cSld>
@@ -10332,14 +10160,14 @@
             <p:ph type="tbl" sz="quarter" idx="14"/>
             <p:extLst>
               <p:ext uri="{D42A27DB-BD31-4B8C-83A1-F6EECF244321}">
-                <p14:modId xmlns:p14="http://schemas.microsoft.com/office/powerpoint/2010/main" val="3238361514"/>
+                <p14:modId xmlns:p14="http://schemas.microsoft.com/office/powerpoint/2010/main" val="2414726318"/>
               </p:ext>
             </p:extLst>
           </p:nvPr>
         </p:nvGraphicFramePr>
         <p:xfrm>
           <a:off x="838200" y="2111375"/>
-          <a:ext cx="10477104" cy="2664000"/>
+          <a:ext cx="10477104" cy="2016000"/>
         </p:xfrm>
         <a:graphic>
           <a:graphicData uri="http://schemas.openxmlformats.org/drawingml/2006/table">
@@ -10481,102 +10309,6 @@
                     <a:bodyPr/>
                     <a:lstStyle/>
                     <a:p>
-                      <a:r>
-                        <a:rPr lang="en-US" sz="1800" b="1" kern="1200" dirty="0">
-                          <a:solidFill>
-                            <a:schemeClr val="tx1"/>
-                          </a:solidFill>
-                          <a:effectLst/>
-                          <a:latin typeface="+mn-lt"/>
-                          <a:ea typeface="+mn-ea"/>
-                          <a:cs typeface="+mn-cs"/>
-                        </a:rPr>
-                        <a:t>Communication</a:t>
-                      </a:r>
-                    </a:p>
-                  </a:txBody>
-                  <a:tcPr anchor="ctr"/>
-                </a:tc>
-                <a:tc>
-                  <a:txBody>
-                    <a:bodyPr/>
-                    <a:lstStyle/>
-                    <a:p>
-                      <a:pPr marL="0" marR="0" lvl="0" indent="0" algn="l" defTabSz="914400" rtl="0" eaLnBrk="1" fontAlgn="auto" latinLnBrk="0" hangingPunct="1">
-                        <a:lnSpc>
-                          <a:spcPct val="100000"/>
-                        </a:lnSpc>
-                        <a:spcBef>
-                          <a:spcPts val="0"/>
-                        </a:spcBef>
-                        <a:spcAft>
-                          <a:spcPts val="0"/>
-                        </a:spcAft>
-                        <a:buClrTx/>
-                        <a:buSzTx/>
-                        <a:buFontTx/>
-                        <a:buNone/>
-                        <a:tabLst/>
-                        <a:defRPr/>
-                      </a:pPr>
-                      <a:r>
-                        <a:rPr lang="en-US" sz="1800" b="0" kern="1200" dirty="0">
-                          <a:solidFill>
-                            <a:schemeClr val="tx1"/>
-                          </a:solidFill>
-                          <a:effectLst/>
-                          <a:latin typeface="+mn-lt"/>
-                          <a:ea typeface="+mn-ea"/>
-                          <a:cs typeface="+mn-cs"/>
-                        </a:rPr>
-                        <a:t>Only phone calls</a:t>
-                      </a:r>
-                      <a:endParaRPr lang="fr-FR" sz="1800" b="0" kern="1200" dirty="0">
-                        <a:solidFill>
-                          <a:schemeClr val="tx1"/>
-                        </a:solidFill>
-                        <a:effectLst/>
-                        <a:latin typeface="+mn-lt"/>
-                        <a:ea typeface="+mn-ea"/>
-                        <a:cs typeface="+mn-cs"/>
-                      </a:endParaRPr>
-                    </a:p>
-                  </a:txBody>
-                  <a:tcPr anchor="ctr"/>
-                </a:tc>
-                <a:tc>
-                  <a:txBody>
-                    <a:bodyPr/>
-                    <a:lstStyle/>
-                    <a:p>
-                      <a:r>
-                        <a:rPr lang="fr-FR" sz="1800" b="0" kern="1200" dirty="0">
-                          <a:solidFill>
-                            <a:schemeClr val="tx1"/>
-                          </a:solidFill>
-                          <a:effectLst/>
-                          <a:latin typeface="+mn-lt"/>
-                          <a:ea typeface="+mn-ea"/>
-                          <a:cs typeface="+mn-cs"/>
-                        </a:rPr>
-                        <a:t>Phone, chat, email, social media</a:t>
-                      </a:r>
-                    </a:p>
-                  </a:txBody>
-                  <a:tcPr anchor="ctr"/>
-                </a:tc>
-                <a:extLst>
-                  <a:ext uri="{0D108BD9-81ED-4DB2-BD59-A6C34878D82A}">
-                    <a16:rowId xmlns:a16="http://schemas.microsoft.com/office/drawing/2014/main" val="3873867931"/>
-                  </a:ext>
-                </a:extLst>
-              </a:tr>
-              <a:tr h="648000">
-                <a:tc>
-                  <a:txBody>
-                    <a:bodyPr/>
-                    <a:lstStyle/>
-                    <a:p>
                       <a:pPr marL="0" marR="0" lvl="0" indent="0" algn="l" defTabSz="914400" rtl="0" eaLnBrk="1" fontAlgn="auto" latinLnBrk="0" hangingPunct="1">
                         <a:lnSpc>
                           <a:spcPct val="100000"/>
@@ -10654,7 +10386,7 @@
                 </a:tc>
                 <a:extLst>
                   <a:ext uri="{0D108BD9-81ED-4DB2-BD59-A6C34878D82A}">
-                    <a16:rowId xmlns:a16="http://schemas.microsoft.com/office/drawing/2014/main" val="85209771"/>
+                    <a16:rowId xmlns:a16="http://schemas.microsoft.com/office/drawing/2014/main" val="3873867931"/>
                   </a:ext>
                 </a:extLst>
               </a:tr>
@@ -10665,7 +10397,7 @@
                     <a:lstStyle/>
                     <a:p>
                       <a:r>
-                        <a:rPr lang="en-US" sz="1800" b="1" kern="1200" dirty="0">
+                        <a:rPr lang="en-US" sz="1800" b="1" kern="1200">
                           <a:solidFill>
                             <a:schemeClr val="tx1"/>
                           </a:solidFill>
@@ -10674,8 +10406,17 @@
                           <a:ea typeface="+mn-ea"/>
                           <a:cs typeface="+mn-cs"/>
                         </a:rPr>
-                        <a:t>Example</a:t>
+                        <a:t>Communication</a:t>
                       </a:r>
+                      <a:endParaRPr lang="en-US" sz="1800" b="1" kern="1200" dirty="0">
+                        <a:solidFill>
+                          <a:schemeClr val="tx1"/>
+                        </a:solidFill>
+                        <a:effectLst/>
+                        <a:latin typeface="+mn-lt"/>
+                        <a:ea typeface="+mn-ea"/>
+                        <a:cs typeface="+mn-cs"/>
+                      </a:endParaRPr>
                     </a:p>
                   </a:txBody>
                   <a:tcPr anchor="ctr"/>
@@ -10712,8 +10453,17 @@
                           <a:ea typeface="+mn-ea"/>
                           <a:cs typeface="+mn-cs"/>
                         </a:rPr>
-                        <a:t>Calling your bank by phone</a:t>
+                        <a:t>Only phone calls</a:t>
                       </a:r>
+                      <a:endParaRPr lang="fr-FR" sz="1800" b="0" kern="1200" dirty="0">
+                        <a:solidFill>
+                          <a:schemeClr val="tx1"/>
+                        </a:solidFill>
+                        <a:effectLst/>
+                        <a:latin typeface="+mn-lt"/>
+                        <a:ea typeface="+mn-ea"/>
+                        <a:cs typeface="+mn-cs"/>
+                      </a:endParaRPr>
                     </a:p>
                   </a:txBody>
                   <a:tcPr anchor="ctr"/>
@@ -10723,25 +10473,8 @@
                     <a:bodyPr/>
                     <a:lstStyle/>
                     <a:p>
-                      <a:pPr marL="0" marR="0" lvl="0" indent="0" algn="l" defTabSz="914400" rtl="0" eaLnBrk="1" fontAlgn="auto" latinLnBrk="0" hangingPunct="1">
-                        <a:lnSpc>
-                          <a:spcPct val="100000"/>
-                        </a:lnSpc>
-                        <a:spcBef>
-                          <a:spcPts val="0"/>
-                        </a:spcBef>
-                        <a:spcAft>
-                          <a:spcPts val="0"/>
-                        </a:spcAft>
-                        <a:buClrTx/>
-                        <a:buSzTx/>
-                        <a:buFontTx/>
-                        <a:buNone/>
-                        <a:tabLst/>
-                        <a:defRPr/>
-                      </a:pPr>
                       <a:r>
-                        <a:rPr lang="en-US" sz="1800" b="0" kern="1200" dirty="0">
+                        <a:rPr lang="fr-FR" sz="1800" b="0" kern="1200" dirty="0">
                           <a:solidFill>
                             <a:schemeClr val="tx1"/>
                           </a:solidFill>
@@ -10750,7 +10483,7 @@
                           <a:ea typeface="+mn-ea"/>
                           <a:cs typeface="+mn-cs"/>
                         </a:rPr>
-                        <a:t>Chatting with Apple Support online</a:t>
+                        <a:t>Phone, chat, email, social media</a:t>
                       </a:r>
                     </a:p>
                   </a:txBody>
@@ -10758,7 +10491,7 @@
                 </a:tc>
                 <a:extLst>
                   <a:ext uri="{0D108BD9-81ED-4DB2-BD59-A6C34878D82A}">
-                    <a16:rowId xmlns:a16="http://schemas.microsoft.com/office/drawing/2014/main" val="4061031278"/>
+                    <a16:rowId xmlns:a16="http://schemas.microsoft.com/office/drawing/2014/main" val="85209771"/>
                   </a:ext>
                 </a:extLst>
               </a:tr>
@@ -11135,7 +10868,7 @@
             </a:pPr>
             <a:r>
               <a:rPr lang="en-US" b="0" dirty="0"/>
-              <a:t>A contact center only uses phone calls.</a:t>
+              <a:t>A call center only uses phone calls.</a:t>
             </a:r>
           </a:p>
           <a:p>
@@ -11145,10 +10878,10 @@
             <a:r>
               <a:rPr lang="en-US" b="1" dirty="0">
                 <a:solidFill>
-                  <a:srgbClr val="C00000"/>
+                  <a:srgbClr val="00B050"/>
                 </a:solidFill>
               </a:rPr>
-              <a:t>False</a:t>
+              <a:t>True</a:t>
             </a:r>
           </a:p>
           <a:p>

</xml_diff>